<commit_message>
Update Presentation ASPNET MVC Core - Part II.pptx
</commit_message>
<xml_diff>
--- a/Presentation ASPNET MVC Core - Part II.pptx
+++ b/Presentation ASPNET MVC Core - Part II.pptx
@@ -5,19 +5,19 @@
     <p:sldMasterId id="2147483648" r:id="rId1"/>
   </p:sldMasterIdLst>
   <p:notesMasterIdLst>
-    <p:notesMasterId r:id="rId33"/>
+    <p:notesMasterId r:id="rId34"/>
   </p:notesMasterIdLst>
   <p:handoutMasterIdLst>
-    <p:handoutMasterId r:id="rId34"/>
+    <p:handoutMasterId r:id="rId35"/>
   </p:handoutMasterIdLst>
   <p:sldIdLst>
     <p:sldId id="493" r:id="rId2"/>
     <p:sldId id="671" r:id="rId3"/>
     <p:sldId id="679" r:id="rId4"/>
-    <p:sldId id="674" r:id="rId5"/>
-    <p:sldId id="745" r:id="rId6"/>
-    <p:sldId id="668" r:id="rId7"/>
-    <p:sldId id="687" r:id="rId8"/>
+    <p:sldId id="829" r:id="rId5"/>
+    <p:sldId id="830" r:id="rId6"/>
+    <p:sldId id="831" r:id="rId7"/>
+    <p:sldId id="832" r:id="rId8"/>
     <p:sldId id="826" r:id="rId9"/>
     <p:sldId id="828" r:id="rId10"/>
     <p:sldId id="776" r:id="rId11"/>
@@ -42,6 +42,7 @@
     <p:sldId id="807" r:id="rId30"/>
     <p:sldId id="780" r:id="rId31"/>
     <p:sldId id="808" r:id="rId32"/>
+    <p:sldId id="729" r:id="rId33"/>
   </p:sldIdLst>
   <p:sldSz cx="12192000" cy="6858000"/>
   <p:notesSz cx="9928225" cy="6797675"/>
@@ -148,10 +149,14 @@
             <p14:sldId id="493"/>
             <p14:sldId id="671"/>
             <p14:sldId id="679"/>
-            <p14:sldId id="674"/>
-            <p14:sldId id="745"/>
-            <p14:sldId id="668"/>
-            <p14:sldId id="687"/>
+            <p14:sldId id="829"/>
+            <p14:sldId id="830"/>
+            <p14:sldId id="831"/>
+            <p14:sldId id="832"/>
+          </p14:sldIdLst>
+        </p14:section>
+        <p14:section name="Table of Contents" id="{54C0E607-BB45-499B-87B8-B7185009D149}">
+          <p14:sldIdLst>
             <p14:sldId id="826"/>
             <p14:sldId id="828"/>
           </p14:sldIdLst>
@@ -188,6 +193,11 @@
             <p14:sldId id="807"/>
             <p14:sldId id="780"/>
             <p14:sldId id="808"/>
+          </p14:sldIdLst>
+        </p14:section>
+        <p14:section name="Thank you" id="{3C1B9F4D-6B8D-4CB1-B63B-4F7C91E4B118}">
+          <p14:sldIdLst>
+            <p14:sldId id="729"/>
           </p14:sldIdLst>
         </p14:section>
       </p14:sectionLst>
@@ -295,7 +305,7 @@
           <a:p>
             <a:fld id="{CD54E0B9-A397-428E-BA01-CD7A34B572EB}" type="datetimeFigureOut">
               <a:rPr lang="en-US" smtClean="0"/>
-              <a:t>5/23/2020</a:t>
+              <a:t>5/21/2021</a:t>
             </a:fld>
             <a:endParaRPr lang="en-US"/>
           </a:p>
@@ -460,7 +470,7 @@
           <a:p>
             <a:fld id="{AA161301-18C9-4CA0-A0BF-791B6E0DDD4D}" type="datetimeFigureOut">
               <a:rPr lang="en-GB" smtClean="0"/>
-              <a:t>23/05/2020</a:t>
+              <a:t>21/05/2021</a:t>
             </a:fld>
             <a:endParaRPr lang="en-GB"/>
           </a:p>
@@ -772,7 +782,10 @@
           <a:bodyPr/>
           <a:lstStyle/>
           <a:p>
-            <a:endParaRPr lang="en-US" dirty="0"/>
+            <a:r>
+              <a:rPr lang="ro-RO" dirty="0"/>
+              <a:t>https://www.apress.com/gp/book/9781484252833</a:t>
+            </a:r>
           </a:p>
         </p:txBody>
       </p:sp>
@@ -783,7 +796,7 @@
             <a:spLocks noGrp="1"/>
           </p:cNvSpPr>
           <p:nvPr>
-            <p:ph type="sldNum" sz="quarter" idx="10"/>
+            <p:ph type="sldNum" sz="quarter" idx="5"/>
           </p:nvPr>
         </p:nvSpPr>
         <p:spPr/>
@@ -793,7 +806,7 @@
           <a:p>
             <a:fld id="{0BF20BA8-12AF-476D-99B2-894C09A4EE62}" type="slidenum">
               <a:rPr lang="en-GB" smtClean="0"/>
-              <a:t>12</a:t>
+              <a:t>4</a:t>
             </a:fld>
             <a:endParaRPr lang="en-GB"/>
           </a:p>
@@ -802,7 +815,7 @@
     </p:spTree>
     <p:extLst>
       <p:ext uri="{BB962C8B-B14F-4D97-AF65-F5344CB8AC3E}">
-        <p14:creationId xmlns:p14="http://schemas.microsoft.com/office/powerpoint/2010/main" val="2822178622"/>
+        <p14:creationId xmlns:p14="http://schemas.microsoft.com/office/powerpoint/2010/main" val="84239186"/>
       </p:ext>
     </p:extLst>
   </p:cSld>
@@ -877,7 +890,7 @@
           <a:p>
             <a:fld id="{0BF20BA8-12AF-476D-99B2-894C09A4EE62}" type="slidenum">
               <a:rPr lang="en-GB" smtClean="0"/>
-              <a:t>13</a:t>
+              <a:t>12</a:t>
             </a:fld>
             <a:endParaRPr lang="en-GB"/>
           </a:p>
@@ -886,7 +899,7 @@
     </p:spTree>
     <p:extLst>
       <p:ext uri="{BB962C8B-B14F-4D97-AF65-F5344CB8AC3E}">
-        <p14:creationId xmlns:p14="http://schemas.microsoft.com/office/powerpoint/2010/main" val="4031206487"/>
+        <p14:creationId xmlns:p14="http://schemas.microsoft.com/office/powerpoint/2010/main" val="2822178622"/>
       </p:ext>
     </p:extLst>
   </p:cSld>
@@ -940,20 +953,7 @@
           <a:bodyPr/>
           <a:lstStyle/>
           <a:p>
-            <a:r>
-              <a:rPr lang="en-US" dirty="0"/>
-              <a:t>References:</a:t>
-            </a:r>
-          </a:p>
-          <a:p>
-            <a:pPr marL="171450" indent="-171450">
-              <a:buFont typeface="Arial" panose="020B0604020202020204" pitchFamily="34" charset="0"/>
-              <a:buChar char="•"/>
-            </a:pPr>
-            <a:r>
-              <a:rPr lang="en-US" dirty="0"/>
-              <a:t>https://docs.microsoft.com/en-us/aspnet/core/security/authorization/introduction</a:t>
-            </a:r>
+            <a:endParaRPr lang="en-US" dirty="0"/>
           </a:p>
         </p:txBody>
       </p:sp>
@@ -974,7 +974,7 @@
           <a:p>
             <a:fld id="{0BF20BA8-12AF-476D-99B2-894C09A4EE62}" type="slidenum">
               <a:rPr lang="en-GB" smtClean="0"/>
-              <a:t>23</a:t>
+              <a:t>13</a:t>
             </a:fld>
             <a:endParaRPr lang="en-GB"/>
           </a:p>
@@ -983,7 +983,7 @@
     </p:spTree>
     <p:extLst>
       <p:ext uri="{BB962C8B-B14F-4D97-AF65-F5344CB8AC3E}">
-        <p14:creationId xmlns:p14="http://schemas.microsoft.com/office/powerpoint/2010/main" val="3113063788"/>
+        <p14:creationId xmlns:p14="http://schemas.microsoft.com/office/powerpoint/2010/main" val="4031206487"/>
       </p:ext>
     </p:extLst>
   </p:cSld>
@@ -1071,6 +1071,103 @@
           <a:p>
             <a:fld id="{0BF20BA8-12AF-476D-99B2-894C09A4EE62}" type="slidenum">
               <a:rPr lang="en-GB" smtClean="0"/>
+              <a:t>23</a:t>
+            </a:fld>
+            <a:endParaRPr lang="en-GB"/>
+          </a:p>
+        </p:txBody>
+      </p:sp>
+    </p:spTree>
+    <p:extLst>
+      <p:ext uri="{BB962C8B-B14F-4D97-AF65-F5344CB8AC3E}">
+        <p14:creationId xmlns:p14="http://schemas.microsoft.com/office/powerpoint/2010/main" val="3113063788"/>
+      </p:ext>
+    </p:extLst>
+  </p:cSld>
+  <p:clrMapOvr>
+    <a:masterClrMapping/>
+  </p:clrMapOvr>
+</p:notes>
+</file>
+
+<file path=ppt/notesSlides/notesSlide5.xml><?xml version="1.0" encoding="utf-8"?>
+<p:notes xmlns:a="http://schemas.openxmlformats.org/drawingml/2006/main" xmlns:r="http://schemas.openxmlformats.org/officeDocument/2006/relationships" xmlns:p="http://schemas.openxmlformats.org/presentationml/2006/main">
+  <p:cSld>
+    <p:spTree>
+      <p:nvGrpSpPr>
+        <p:cNvPr id="1" name=""/>
+        <p:cNvGrpSpPr/>
+        <p:nvPr/>
+      </p:nvGrpSpPr>
+      <p:grpSpPr>
+        <a:xfrm>
+          <a:off x="0" y="0"/>
+          <a:ext cx="0" cy="0"/>
+          <a:chOff x="0" y="0"/>
+          <a:chExt cx="0" cy="0"/>
+        </a:xfrm>
+      </p:grpSpPr>
+      <p:sp>
+        <p:nvSpPr>
+          <p:cNvPr id="2" name="Slide Image Placeholder 1"/>
+          <p:cNvSpPr>
+            <a:spLocks noGrp="1" noRot="1" noChangeAspect="1"/>
+          </p:cNvSpPr>
+          <p:nvPr>
+            <p:ph type="sldImg"/>
+          </p:nvPr>
+        </p:nvSpPr>
+        <p:spPr/>
+      </p:sp>
+      <p:sp>
+        <p:nvSpPr>
+          <p:cNvPr id="3" name="Notes Placeholder 2"/>
+          <p:cNvSpPr>
+            <a:spLocks noGrp="1"/>
+          </p:cNvSpPr>
+          <p:nvPr>
+            <p:ph type="body" idx="1"/>
+          </p:nvPr>
+        </p:nvSpPr>
+        <p:spPr/>
+        <p:txBody>
+          <a:bodyPr/>
+          <a:lstStyle/>
+          <a:p>
+            <a:r>
+              <a:rPr lang="en-US" dirty="0"/>
+              <a:t>References:</a:t>
+            </a:r>
+          </a:p>
+          <a:p>
+            <a:pPr marL="171450" indent="-171450">
+              <a:buFont typeface="Arial" panose="020B0604020202020204" pitchFamily="34" charset="0"/>
+              <a:buChar char="•"/>
+            </a:pPr>
+            <a:r>
+              <a:rPr lang="en-US" dirty="0"/>
+              <a:t>https://docs.microsoft.com/en-us/aspnet/core/security/authorization/introduction</a:t>
+            </a:r>
+          </a:p>
+        </p:txBody>
+      </p:sp>
+      <p:sp>
+        <p:nvSpPr>
+          <p:cNvPr id="4" name="Slide Number Placeholder 3"/>
+          <p:cNvSpPr>
+            <a:spLocks noGrp="1"/>
+          </p:cNvSpPr>
+          <p:nvPr>
+            <p:ph type="sldNum" sz="quarter" idx="10"/>
+          </p:nvPr>
+        </p:nvSpPr>
+        <p:spPr/>
+        <p:txBody>
+          <a:bodyPr/>
+          <a:lstStyle/>
+          <a:p>
+            <a:fld id="{0BF20BA8-12AF-476D-99B2-894C09A4EE62}" type="slidenum">
+              <a:rPr lang="en-GB" smtClean="0"/>
               <a:t>24</a:t>
             </a:fld>
             <a:endParaRPr lang="en-GB"/>
@@ -1090,7 +1187,7 @@
 </p:notes>
 </file>
 
-<file path=ppt/notesSlides/notesSlide5.xml><?xml version="1.0" encoding="utf-8"?>
+<file path=ppt/notesSlides/notesSlide6.xml><?xml version="1.0" encoding="utf-8"?>
 <p:notes xmlns:a="http://schemas.openxmlformats.org/drawingml/2006/main" xmlns:r="http://schemas.openxmlformats.org/officeDocument/2006/relationships" xmlns:p="http://schemas.openxmlformats.org/presentationml/2006/main">
   <p:cSld>
     <p:spTree>
@@ -21210,6 +21307,70 @@
 </p:sld>
 </file>
 
+<file path=ppt/slides/slide32.xml><?xml version="1.0" encoding="utf-8"?>
+<p:sld xmlns:a="http://schemas.openxmlformats.org/drawingml/2006/main" xmlns:r="http://schemas.openxmlformats.org/officeDocument/2006/relationships" xmlns:p="http://schemas.openxmlformats.org/presentationml/2006/main">
+  <p:cSld>
+    <p:spTree>
+      <p:nvGrpSpPr>
+        <p:cNvPr id="1" name=""/>
+        <p:cNvGrpSpPr/>
+        <p:nvPr/>
+      </p:nvGrpSpPr>
+      <p:grpSpPr>
+        <a:xfrm>
+          <a:off x="0" y="0"/>
+          <a:ext cx="0" cy="0"/>
+          <a:chOff x="0" y="0"/>
+          <a:chExt cx="0" cy="0"/>
+        </a:xfrm>
+      </p:grpSpPr>
+      <p:sp>
+        <p:nvSpPr>
+          <p:cNvPr id="4" name="Title 3"/>
+          <p:cNvSpPr>
+            <a:spLocks noGrp="1"/>
+          </p:cNvSpPr>
+          <p:nvPr>
+            <p:ph type="title"/>
+          </p:nvPr>
+        </p:nvSpPr>
+        <p:spPr/>
+        <p:txBody>
+          <a:bodyPr/>
+          <a:lstStyle/>
+          <a:p>
+            <a:r>
+              <a:rPr lang="en-US" dirty="0"/>
+              <a:t>Thank you!</a:t>
+            </a:r>
+          </a:p>
+        </p:txBody>
+      </p:sp>
+    </p:spTree>
+    <p:extLst>
+      <p:ext uri="{BB962C8B-B14F-4D97-AF65-F5344CB8AC3E}">
+        <p14:creationId xmlns:p14="http://schemas.microsoft.com/office/powerpoint/2010/main" val="3366205155"/>
+      </p:ext>
+    </p:extLst>
+  </p:cSld>
+  <p:clrMapOvr>
+    <a:masterClrMapping/>
+  </p:clrMapOvr>
+  <mc:AlternateContent xmlns:mc="http://schemas.openxmlformats.org/markup-compatibility/2006" xmlns:p14="http://schemas.microsoft.com/office/powerpoint/2010/main">
+    <mc:Choice Requires="p14">
+      <p:transition spd="med" p14:dur="700" advClick="0" advTm="1500">
+        <p:fade/>
+      </p:transition>
+    </mc:Choice>
+    <mc:Fallback xmlns="">
+      <p:transition spd="med" advClick="0" advTm="1500">
+        <p:fade/>
+      </p:transition>
+    </mc:Fallback>
+  </mc:AlternateContent>
+</p:sld>
+</file>
+
 <file path=ppt/slides/slide4.xml><?xml version="1.0" encoding="utf-8"?>
 <p:sld xmlns:a="http://schemas.openxmlformats.org/drawingml/2006/main" xmlns:r="http://schemas.openxmlformats.org/officeDocument/2006/relationships" xmlns:p="http://schemas.openxmlformats.org/presentationml/2006/main">
   <p:cSld>
@@ -21275,7 +21436,7 @@
             </a:pPr>
             <a:r>
               <a:rPr lang="en-US" b="1" dirty="0"/>
-              <a:t>Pro ASP.NET Core MVC 2</a:t>
+              <a:t>Pro ASP.NET Core 3</a:t>
             </a:r>
           </a:p>
           <a:p>
@@ -21295,7 +21456,7 @@
             </a:pPr>
             <a:r>
               <a:rPr lang="en-US" dirty="0"/>
-              <a:t>Now in its 7th edition, the best selling book on MVC is now updated for ASP.NET Core MVC.</a:t>
+              <a:t>Now in its 8th edition, the best-selling book on MVC is now updated for ASP.NET Core.</a:t>
             </a:r>
           </a:p>
           <a:p>
@@ -21305,9 +21466,9 @@
             </a:pPr>
             <a:r>
               <a:rPr lang="en-US" dirty="0">
-                <a:hlinkClick r:id="rId2"/>
-              </a:rPr>
-              <a:t>https://www.apress.com/gp/book/9781484231494</a:t>
+                <a:hlinkClick r:id="rId3"/>
+              </a:rPr>
+              <a:t>https://www.apress.com/gp/book/9781484254394</a:t>
             </a:r>
             <a:endParaRPr lang="en-US" dirty="0"/>
           </a:p>
@@ -21318,14 +21479,10 @@
             </a:pPr>
             <a:r>
               <a:rPr lang="en-US" dirty="0">
-                <a:hlinkClick r:id="rId3"/>
-              </a:rPr>
-              <a:t>https://github.com/apress/pro-asp.net-core-mvc-2</a:t>
-            </a:r>
-            <a:endParaRPr lang="en-US" dirty="0"/>
-          </a:p>
-          <a:p>
-            <a:pPr lvl="1"/>
+                <a:hlinkClick r:id="rId4"/>
+              </a:rPr>
+              <a:t>https://github.com/Apress/pro-asp.net-core-3</a:t>
+            </a:r>
             <a:endParaRPr lang="en-US" dirty="0"/>
           </a:p>
         </p:txBody>
@@ -21354,55 +21511,44 @@
       </p:sp>
       <p:pic>
         <p:nvPicPr>
-          <p:cNvPr id="1028" name="Picture 4" descr="https://images-na.ssl-images-amazon.com/images/I/51U5-MDFiqL._SX348_BO1,204,203,200_.jpg">
+          <p:cNvPr id="6" name="Picture 5" descr="Logo&#10;&#10;Description automatically generated with low confidence">
             <a:extLst>
               <a:ext uri="{FF2B5EF4-FFF2-40B4-BE49-F238E27FC236}">
-                <a16:creationId xmlns:a16="http://schemas.microsoft.com/office/drawing/2014/main" id="{B365DAE5-A9DC-49FD-BF99-291F47833E9B}"/>
+                <a16:creationId xmlns:a16="http://schemas.microsoft.com/office/drawing/2014/main" id="{0F3DD0FD-3F60-4B52-98E7-47546BC390D4}"/>
               </a:ext>
             </a:extLst>
           </p:cNvPr>
           <p:cNvPicPr>
-            <a:picLocks noChangeAspect="1" noChangeArrowheads="1"/>
+            <a:picLocks noChangeAspect="1"/>
           </p:cNvPicPr>
           <p:nvPr/>
         </p:nvPicPr>
         <p:blipFill>
-          <a:blip r:embed="rId4">
+          <a:blip r:embed="rId5" cstate="print">
             <a:extLst>
               <a:ext uri="{28A0092B-C50C-407E-A947-70E740481C1C}">
                 <a14:useLocalDpi xmlns:a14="http://schemas.microsoft.com/office/drawing/2010/main" val="0"/>
               </a:ext>
             </a:extLst>
           </a:blip>
-          <a:srcRect/>
           <a:stretch>
             <a:fillRect/>
           </a:stretch>
         </p:blipFill>
-        <p:spPr bwMode="auto">
+        <p:spPr>
           <a:xfrm>
-            <a:off x="8062106" y="1401382"/>
-            <a:ext cx="3333750" cy="4752975"/>
+            <a:off x="8040216" y="1556792"/>
+            <a:ext cx="3240360" cy="4306113"/>
           </a:xfrm>
           <a:prstGeom prst="rect">
             <a:avLst/>
           </a:prstGeom>
-          <a:noFill/>
-          <a:extLst>
-            <a:ext uri="{909E8E84-426E-40DD-AFC4-6F175D3DCCD1}">
-              <a14:hiddenFill xmlns:a14="http://schemas.microsoft.com/office/drawing/2010/main">
-                <a:solidFill>
-                  <a:srgbClr val="FFFFFF"/>
-                </a:solidFill>
-              </a14:hiddenFill>
-            </a:ext>
-          </a:extLst>
         </p:spPr>
       </p:pic>
     </p:spTree>
     <p:extLst>
       <p:ext uri="{BB962C8B-B14F-4D97-AF65-F5344CB8AC3E}">
-        <p14:creationId xmlns:p14="http://schemas.microsoft.com/office/powerpoint/2010/main" val="3064523811"/>
+        <p14:creationId xmlns:p14="http://schemas.microsoft.com/office/powerpoint/2010/main" val="930814865"/>
       </p:ext>
     </p:extLst>
   </p:cSld>
@@ -21636,7 +21782,7 @@
     </p:spTree>
     <p:extLst>
       <p:ext uri="{BB962C8B-B14F-4D97-AF65-F5344CB8AC3E}">
-        <p14:creationId xmlns:p14="http://schemas.microsoft.com/office/powerpoint/2010/main" val="2735732462"/>
+        <p14:creationId xmlns:p14="http://schemas.microsoft.com/office/powerpoint/2010/main" val="3449755432"/>
       </p:ext>
     </p:extLst>
   </p:cSld>
@@ -21836,7 +21982,7 @@
     </p:spTree>
     <p:extLst>
       <p:ext uri="{BB962C8B-B14F-4D97-AF65-F5344CB8AC3E}">
-        <p14:creationId xmlns:p14="http://schemas.microsoft.com/office/powerpoint/2010/main" val="1876554303"/>
+        <p14:creationId xmlns:p14="http://schemas.microsoft.com/office/powerpoint/2010/main" val="3351431601"/>
       </p:ext>
     </p:extLst>
   </p:cSld>
@@ -21960,7 +22106,7 @@
               <a:rPr lang="en-US" u="sng" dirty="0">
                 <a:hlinkClick r:id="rId3"/>
               </a:rPr>
-              <a:t>https://docs.microsoft.com/en-us/dotnet/api/?view=aspnetcore-2.2</a:t>
+              <a:t>https://docs.microsoft.com/en-us/dotnet/api/?view=net-5.0</a:t>
             </a:r>
             <a:endParaRPr lang="en-US" u="sng" dirty="0"/>
           </a:p>
@@ -22048,7 +22194,7 @@
     </p:spTree>
     <p:extLst>
       <p:ext uri="{BB962C8B-B14F-4D97-AF65-F5344CB8AC3E}">
-        <p14:creationId xmlns:p14="http://schemas.microsoft.com/office/powerpoint/2010/main" val="677238849"/>
+        <p14:creationId xmlns:p14="http://schemas.microsoft.com/office/powerpoint/2010/main" val="411187684"/>
       </p:ext>
     </p:extLst>
   </p:cSld>

</xml_diff>